<commit_message>
Adicionado faturamento na região do Pajeú
</commit_message>
<xml_diff>
--- a/Docs/Apresentação.pptx
+++ b/Docs/Apresentação.pptx
@@ -5,7 +5,7 @@
     <p:sldMasterId id="2147483659" r:id="rId1"/>
   </p:sldMasterIdLst>
   <p:notesMasterIdLst>
-    <p:notesMasterId r:id="rId39"/>
+    <p:notesMasterId r:id="rId40"/>
   </p:notesMasterIdLst>
   <p:sldIdLst>
     <p:sldId id="256" r:id="rId2"/>
@@ -41,10 +41,11 @@
     <p:sldId id="283" r:id="rId32"/>
     <p:sldId id="284" r:id="rId33"/>
     <p:sldId id="285" r:id="rId34"/>
-    <p:sldId id="286" r:id="rId35"/>
-    <p:sldId id="287" r:id="rId36"/>
-    <p:sldId id="288" r:id="rId37"/>
-    <p:sldId id="289" r:id="rId38"/>
+    <p:sldId id="293" r:id="rId35"/>
+    <p:sldId id="286" r:id="rId36"/>
+    <p:sldId id="287" r:id="rId37"/>
+    <p:sldId id="288" r:id="rId38"/>
+    <p:sldId id="289" r:id="rId39"/>
   </p:sldIdLst>
   <p:sldSz cx="9144000" cy="5143500" type="screen16x9"/>
   <p:notesSz cx="6858000" cy="9144000"/>
@@ -3238,6 +3239,115 @@
   <p:cSld>
     <p:spTree>
       <p:nvGrpSpPr>
+        <p:cNvPr id="1" name="Shape 221"/>
+        <p:cNvGrpSpPr/>
+        <p:nvPr/>
+      </p:nvGrpSpPr>
+      <p:grpSpPr>
+        <a:xfrm>
+          <a:off x="0" y="0"/>
+          <a:ext cx="0" cy="0"/>
+          <a:chOff x="0" y="0"/>
+          <a:chExt cx="0" cy="0"/>
+        </a:xfrm>
+      </p:grpSpPr>
+      <p:sp>
+        <p:nvSpPr>
+          <p:cNvPr id="222" name="Google Shape;222;g9d1ad0ecfb_0_10:notes"/>
+          <p:cNvSpPr>
+            <a:spLocks noGrp="1" noRot="1" noChangeAspect="1"/>
+          </p:cNvSpPr>
+          <p:nvPr>
+            <p:ph type="sldImg" idx="2"/>
+          </p:nvPr>
+        </p:nvSpPr>
+        <p:spPr>
+          <a:xfrm>
+            <a:off x="381000" y="685800"/>
+            <a:ext cx="6096000" cy="3429000"/>
+          </a:xfrm>
+          <a:custGeom>
+            <a:avLst/>
+            <a:gdLst/>
+            <a:ahLst/>
+            <a:cxnLst/>
+            <a:rect l="l" t="t" r="r" b="b"/>
+            <a:pathLst>
+              <a:path w="120000" h="120000" extrusionOk="0">
+                <a:moveTo>
+                  <a:pt x="0" y="0"/>
+                </a:moveTo>
+                <a:lnTo>
+                  <a:pt x="120000" y="0"/>
+                </a:lnTo>
+                <a:lnTo>
+                  <a:pt x="120000" y="120000"/>
+                </a:lnTo>
+                <a:lnTo>
+                  <a:pt x="0" y="120000"/>
+                </a:lnTo>
+                <a:close/>
+              </a:path>
+            </a:pathLst>
+          </a:custGeom>
+        </p:spPr>
+      </p:sp>
+      <p:sp>
+        <p:nvSpPr>
+          <p:cNvPr id="223" name="Google Shape;223;g9d1ad0ecfb_0_10:notes"/>
+          <p:cNvSpPr txBox="1">
+            <a:spLocks noGrp="1"/>
+          </p:cNvSpPr>
+          <p:nvPr>
+            <p:ph type="body" idx="1"/>
+          </p:nvPr>
+        </p:nvSpPr>
+        <p:spPr>
+          <a:xfrm>
+            <a:off x="685800" y="4343400"/>
+            <a:ext cx="5486400" cy="4114800"/>
+          </a:xfrm>
+          <a:prstGeom prst="rect">
+            <a:avLst/>
+          </a:prstGeom>
+        </p:spPr>
+        <p:txBody>
+          <a:bodyPr spcFirstLastPara="1" wrap="square" lIns="91425" tIns="91425" rIns="91425" bIns="91425" anchor="t" anchorCtr="0">
+            <a:noAutofit/>
+          </a:bodyPr>
+          <a:lstStyle/>
+          <a:p>
+            <a:pPr marL="0" lvl="0" indent="0" algn="l" rtl="0">
+              <a:spcBef>
+                <a:spcPts val="0"/>
+              </a:spcBef>
+              <a:spcAft>
+                <a:spcPts val="0"/>
+              </a:spcAft>
+              <a:buNone/>
+            </a:pPr>
+            <a:endParaRPr/>
+          </a:p>
+        </p:txBody>
+      </p:sp>
+    </p:spTree>
+    <p:extLst>
+      <p:ext uri="{BB962C8B-B14F-4D97-AF65-F5344CB8AC3E}">
+        <p14:creationId xmlns:p14="http://schemas.microsoft.com/office/powerpoint/2010/main" val="2072177459"/>
+      </p:ext>
+    </p:extLst>
+  </p:cSld>
+  <p:clrMapOvr>
+    <a:masterClrMapping/>
+  </p:clrMapOvr>
+</p:notes>
+</file>
+
+<file path=ppt/notesSlides/notesSlide32.xml><?xml version="1.0" encoding="utf-8"?>
+<p:notes xmlns:a="http://schemas.openxmlformats.org/drawingml/2006/main" xmlns:r="http://schemas.openxmlformats.org/officeDocument/2006/relationships" xmlns:p="http://schemas.openxmlformats.org/presentationml/2006/main" showMasterSp="0" showMasterPhAnim="0">
+  <p:cSld>
+    <p:spTree>
+      <p:nvGrpSpPr>
         <p:cNvPr id="1" name="Shape 227"/>
         <p:cNvGrpSpPr/>
         <p:nvPr/>
@@ -3337,7 +3447,7 @@
 </p:notes>
 </file>
 
-<file path=ppt/notesSlides/notesSlide32.xml><?xml version="1.0" encoding="utf-8"?>
+<file path=ppt/notesSlides/notesSlide33.xml><?xml version="1.0" encoding="utf-8"?>
 <p:notes xmlns:a="http://schemas.openxmlformats.org/drawingml/2006/main" xmlns:r="http://schemas.openxmlformats.org/officeDocument/2006/relationships" xmlns:p="http://schemas.openxmlformats.org/presentationml/2006/main" showMasterSp="0" showMasterPhAnim="0">
   <p:cSld>
     <p:spTree>
@@ -3441,7 +3551,7 @@
 </p:notes>
 </file>
 
-<file path=ppt/notesSlides/notesSlide33.xml><?xml version="1.0" encoding="utf-8"?>
+<file path=ppt/notesSlides/notesSlide34.xml><?xml version="1.0" encoding="utf-8"?>
 <p:notes xmlns:a="http://schemas.openxmlformats.org/drawingml/2006/main" xmlns:r="http://schemas.openxmlformats.org/officeDocument/2006/relationships" xmlns:p="http://schemas.openxmlformats.org/presentationml/2006/main" showMasterSp="0" showMasterPhAnim="0">
   <p:cSld>
     <p:spTree>
@@ -3545,7 +3655,7 @@
 </p:notes>
 </file>
 
-<file path=ppt/notesSlides/notesSlide34.xml><?xml version="1.0" encoding="utf-8"?>
+<file path=ppt/notesSlides/notesSlide35.xml><?xml version="1.0" encoding="utf-8"?>
 <p:notes xmlns:a="http://schemas.openxmlformats.org/drawingml/2006/main" xmlns:r="http://schemas.openxmlformats.org/officeDocument/2006/relationships" xmlns:p="http://schemas.openxmlformats.org/presentationml/2006/main" showMasterSp="0" showMasterPhAnim="0">
   <p:cSld>
     <p:spTree>
@@ -10751,11 +10861,7 @@
             </a:pPr>
             <a:r>
               <a:rPr lang="pt-BR" dirty="0" smtClean="0"/>
-              <a:t>B. </a:t>
-            </a:r>
-            <a:r>
-              <a:rPr lang="pt-BR" dirty="0" smtClean="0"/>
-              <a:t>Processo: </a:t>
+              <a:t>B. Processo: </a:t>
             </a:r>
           </a:p>
           <a:p>
@@ -11665,15 +11771,7 @@
                   <a:schemeClr val="dk2"/>
                 </a:solidFill>
               </a:rPr>
-              <a:t>(Faturamento): Tipo Aditiva. </a:t>
-            </a:r>
-            <a:r>
-              <a:rPr lang="pt-BR" altLang="pt-BR" sz="1800" dirty="0">
-                <a:solidFill>
-                  <a:schemeClr val="dk2"/>
-                </a:solidFill>
-              </a:rPr>
-              <a:t>(Pode ser somada ao longo de todas as dimensões: tempo, cliente e produto).</a:t>
+              <a:t>(Faturamento): Tipo Aditiva. (Pode ser somada ao longo de todas as dimensões: tempo, cliente e produto).</a:t>
             </a:r>
           </a:p>
           <a:p>
@@ -11749,15 +11847,7 @@
                   <a:schemeClr val="dk2"/>
                 </a:solidFill>
               </a:rPr>
-              <a:t>: Tipo Aditiva. </a:t>
-            </a:r>
-            <a:r>
-              <a:rPr lang="pt-BR" altLang="pt-BR" sz="1800" dirty="0">
-                <a:solidFill>
-                  <a:schemeClr val="dk2"/>
-                </a:solidFill>
-              </a:rPr>
-              <a:t>(Utilizada para contagem de volume de vendas).</a:t>
+              <a:t>: Tipo Aditiva. (Utilizada para contagem de volume de vendas).</a:t>
             </a:r>
           </a:p>
         </p:txBody>
@@ -19455,8 +19545,8 @@
         </p:blipFill>
         <p:spPr>
           <a:xfrm>
-            <a:off x="3931079" y="1602190"/>
-            <a:ext cx="4901221" cy="3226324"/>
+            <a:off x="4247648" y="1602190"/>
+            <a:ext cx="4584652" cy="3017936"/>
           </a:xfrm>
           <a:prstGeom prst="rect">
             <a:avLst/>
@@ -19476,7 +19566,7 @@
         <p:spPr>
           <a:xfrm>
             <a:off x="311700" y="1152475"/>
-            <a:ext cx="8520600" cy="3416400"/>
+            <a:ext cx="8653546" cy="3536403"/>
           </a:xfrm>
           <a:prstGeom prst="rect">
             <a:avLst/>
@@ -19608,22 +19698,12 @@
               <a:t>em meses específicos (</a:t>
             </a:r>
             <a:r>
-              <a:rPr lang="pt-BR" sz="1400" dirty="0" err="1"/>
-              <a:t>ex</a:t>
-            </a:r>
-            <a:r>
-              <a:rPr lang="pt-BR" sz="1400" dirty="0"/>
-              <a:t>: </a:t>
-            </a:r>
-            <a:endParaRPr lang="pt-BR" sz="1400" dirty="0" smtClean="0"/>
-          </a:p>
-          <a:p>
-            <a:pPr lvl="0" indent="-457200" algn="just">
-              <a:buNone/>
-            </a:pPr>
+              <a:rPr lang="pt-BR" sz="1400" dirty="0" err="1" smtClean="0"/>
+              <a:t>ex:Black</a:t>
+            </a:r>
             <a:r>
               <a:rPr lang="pt-BR" sz="1400" dirty="0" smtClean="0"/>
-              <a:t>Black </a:t>
+              <a:t> </a:t>
             </a:r>
             <a:r>
               <a:rPr lang="pt-BR" sz="1400" dirty="0"/>
@@ -19876,8 +19956,6 @@
               </a:spcAft>
               <a:buClrTx/>
               <a:buSzTx/>
-              <a:buFontTx/>
-              <a:buChar char="•"/>
               <a:tabLst/>
             </a:pPr>
             <a:r>
@@ -19886,7 +19964,7 @@
                   <a:schemeClr val="dk2"/>
                 </a:solidFill>
               </a:rPr>
-              <a:t> Existe </a:t>
+              <a:t>Existe </a:t>
             </a:r>
             <a:r>
               <a:rPr lang="pt-BR" altLang="pt-BR" dirty="0">
@@ -19897,7 +19975,7 @@
               <a:t>uma forte concentração de vendas na região Sudeste, especificamente no estado de São Paulo (destacado em </a:t>
             </a:r>
             <a:r>
-              <a:rPr lang="pt-BR" altLang="pt-BR" dirty="0" smtClean="0">
+              <a:rPr lang="pt-BR" altLang="pt-BR" dirty="0">
                 <a:solidFill>
                   <a:schemeClr val="dk2"/>
                 </a:solidFill>
@@ -19959,6 +20037,179 @@
 </file>
 
 <file path=ppt/slides/slide34.xml><?xml version="1.0" encoding="utf-8"?>
+<p:sld xmlns:a="http://schemas.openxmlformats.org/drawingml/2006/main" xmlns:r="http://schemas.openxmlformats.org/officeDocument/2006/relationships" xmlns:p="http://schemas.openxmlformats.org/presentationml/2006/main">
+  <p:cSld>
+    <p:spTree>
+      <p:nvGrpSpPr>
+        <p:cNvPr id="1" name="Shape 224"/>
+        <p:cNvGrpSpPr/>
+        <p:nvPr/>
+      </p:nvGrpSpPr>
+      <p:grpSpPr>
+        <a:xfrm>
+          <a:off x="0" y="0"/>
+          <a:ext cx="0" cy="0"/>
+          <a:chOff x="0" y="0"/>
+          <a:chExt cx="0" cy="0"/>
+        </a:xfrm>
+      </p:grpSpPr>
+      <p:sp>
+        <p:nvSpPr>
+          <p:cNvPr id="225" name="Google Shape;225;p42"/>
+          <p:cNvSpPr txBox="1">
+            <a:spLocks noGrp="1"/>
+          </p:cNvSpPr>
+          <p:nvPr>
+            <p:ph type="title"/>
+          </p:nvPr>
+        </p:nvSpPr>
+        <p:spPr>
+          <a:xfrm>
+            <a:off x="311700" y="261257"/>
+            <a:ext cx="8520600" cy="605017"/>
+          </a:xfrm>
+          <a:prstGeom prst="rect">
+            <a:avLst/>
+          </a:prstGeom>
+        </p:spPr>
+        <p:txBody>
+          <a:bodyPr spcFirstLastPara="1" wrap="square" lIns="91425" tIns="91425" rIns="91425" bIns="91425" anchor="t" anchorCtr="0">
+            <a:noAutofit/>
+          </a:bodyPr>
+          <a:lstStyle/>
+          <a:p>
+            <a:pPr marL="457200" lvl="0" indent="-406400" algn="l" rtl="0">
+              <a:spcBef>
+                <a:spcPts val="0"/>
+              </a:spcBef>
+              <a:spcAft>
+                <a:spcPts val="0"/>
+              </a:spcAft>
+              <a:buSzPts val="2800"/>
+              <a:buAutoNum type="arabicPeriod" startAt="16"/>
+            </a:pPr>
+            <a:r>
+              <a:rPr lang="pt-BR" dirty="0"/>
+              <a:t>Consulta OLAP </a:t>
+            </a:r>
+            <a:r>
+              <a:rPr lang="pt-BR" dirty="0" smtClean="0"/>
+              <a:t>4</a:t>
+            </a:r>
+            <a:endParaRPr dirty="0"/>
+          </a:p>
+        </p:txBody>
+      </p:sp>
+      <p:sp>
+        <p:nvSpPr>
+          <p:cNvPr id="226" name="Google Shape;226;p42"/>
+          <p:cNvSpPr txBox="1">
+            <a:spLocks noGrp="1"/>
+          </p:cNvSpPr>
+          <p:nvPr>
+            <p:ph type="body" idx="1"/>
+          </p:nvPr>
+        </p:nvSpPr>
+        <p:spPr>
+          <a:xfrm>
+            <a:off x="311700" y="866274"/>
+            <a:ext cx="5085323" cy="2715699"/>
+          </a:xfrm>
+          <a:prstGeom prst="rect">
+            <a:avLst/>
+          </a:prstGeom>
+        </p:spPr>
+        <p:txBody>
+          <a:bodyPr spcFirstLastPara="1" wrap="square" lIns="91425" tIns="91425" rIns="91425" bIns="91425" anchor="t" anchorCtr="0">
+            <a:noAutofit/>
+          </a:bodyPr>
+          <a:lstStyle/>
+          <a:p>
+            <a:pPr lvl="0" indent="-368300">
+              <a:buNone/>
+            </a:pPr>
+            <a:r>
+              <a:rPr lang="pt-BR" dirty="0"/>
+              <a:t>Análise de </a:t>
+            </a:r>
+            <a:r>
+              <a:rPr lang="pt-BR" dirty="0" smtClean="0"/>
+              <a:t>Faturamento</a:t>
+            </a:r>
+            <a:r>
+              <a:rPr lang="pt-BR" dirty="0"/>
+              <a:t>: Foco Sertão do </a:t>
+            </a:r>
+            <a:r>
+              <a:rPr lang="pt-BR" dirty="0" smtClean="0"/>
+              <a:t>Pajeú</a:t>
+            </a:r>
+          </a:p>
+          <a:p>
+            <a:pPr marL="88900" lvl="0" indent="0">
+              <a:buNone/>
+            </a:pPr>
+            <a:r>
+              <a:rPr lang="pt-BR" sz="1400" dirty="0"/>
+              <a:t>A criação do agrupamento personalizado permitiu isolar os dados da região do Sertão do Pajeú. </a:t>
+            </a:r>
+            <a:r>
+              <a:rPr lang="pt-BR" sz="1400" dirty="0" smtClean="0"/>
+              <a:t>A análise </a:t>
+            </a:r>
+            <a:r>
+              <a:rPr lang="pt-BR" sz="1400" dirty="0"/>
+              <a:t>revela o volume exato de vendas desta microrregião, permitindo comparar sua representatividade frente ao total de todos os estados e identificar oportunidades de logística dedicada para o interior.</a:t>
+            </a:r>
+            <a:endParaRPr lang="pt-BR" sz="1400" dirty="0"/>
+          </a:p>
+        </p:txBody>
+      </p:sp>
+      <p:pic>
+        <p:nvPicPr>
+          <p:cNvPr id="5" name="Imagem 4"/>
+          <p:cNvPicPr>
+            <a:picLocks noChangeAspect="1"/>
+          </p:cNvPicPr>
+          <p:nvPr/>
+        </p:nvPicPr>
+        <p:blipFill>
+          <a:blip r:embed="rId3"/>
+          <a:stretch>
+            <a:fillRect/>
+          </a:stretch>
+        </p:blipFill>
+        <p:spPr>
+          <a:xfrm>
+            <a:off x="2206935" y="2452346"/>
+            <a:ext cx="4904623" cy="2604569"/>
+          </a:xfrm>
+          <a:prstGeom prst="rect">
+            <a:avLst/>
+          </a:prstGeom>
+        </p:spPr>
+      </p:pic>
+    </p:spTree>
+    <p:extLst>
+      <p:ext uri="{BB962C8B-B14F-4D97-AF65-F5344CB8AC3E}">
+        <p14:creationId xmlns:p14="http://schemas.microsoft.com/office/powerpoint/2010/main" val="1682300082"/>
+      </p:ext>
+    </p:extLst>
+  </p:cSld>
+  <p:clrMapOvr>
+    <a:masterClrMapping/>
+  </p:clrMapOvr>
+  <p:timing>
+    <p:tnLst>
+      <p:par>
+        <p:cTn id="1" dur="indefinite" restart="never" nodeType="tmRoot"/>
+      </p:par>
+    </p:tnLst>
+  </p:timing>
+</p:sld>
+</file>
+
+<file path=ppt/slides/slide35.xml><?xml version="1.0" encoding="utf-8"?>
 <p:sld xmlns:a="http://schemas.openxmlformats.org/drawingml/2006/main" xmlns:r="http://schemas.openxmlformats.org/officeDocument/2006/relationships" xmlns:p="http://schemas.openxmlformats.org/presentationml/2006/main">
   <p:cSld>
     <p:spTree>
@@ -20107,7 +20358,7 @@
 </p:sld>
 </file>
 
-<file path=ppt/slides/slide35.xml><?xml version="1.0" encoding="utf-8"?>
+<file path=ppt/slides/slide36.xml><?xml version="1.0" encoding="utf-8"?>
 <p:sld xmlns:a="http://schemas.openxmlformats.org/drawingml/2006/main" xmlns:r="http://schemas.openxmlformats.org/officeDocument/2006/relationships" xmlns:p="http://schemas.openxmlformats.org/presentationml/2006/main">
   <p:cSld>
     <p:spTree>
@@ -20382,7 +20633,15 @@
                   <a:schemeClr val="dk2"/>
                 </a:solidFill>
               </a:rPr>
-              <a:t>OLIST</a:t>
+              <a:t>OLIST. </a:t>
+            </a:r>
+            <a:r>
+              <a:rPr lang="pt-BR" sz="1300" dirty="0" err="1">
+                <a:solidFill>
+                  <a:schemeClr val="dk2"/>
+                </a:solidFill>
+              </a:rPr>
+              <a:t>Brazilian</a:t>
             </a:r>
             <a:r>
               <a:rPr lang="pt-BR" sz="1300" dirty="0">
@@ -20390,6 +20649,70 @@
                   <a:schemeClr val="dk2"/>
                 </a:solidFill>
               </a:rPr>
+              <a:t> E-Commerce </a:t>
+            </a:r>
+            <a:r>
+              <a:rPr lang="pt-BR" sz="1300" dirty="0" err="1">
+                <a:solidFill>
+                  <a:schemeClr val="dk2"/>
+                </a:solidFill>
+              </a:rPr>
+              <a:t>Public</a:t>
+            </a:r>
+            <a:r>
+              <a:rPr lang="pt-BR" sz="1300" dirty="0">
+                <a:solidFill>
+                  <a:schemeClr val="dk2"/>
+                </a:solidFill>
+              </a:rPr>
+              <a:t> </a:t>
+            </a:r>
+            <a:r>
+              <a:rPr lang="pt-BR" sz="1300" dirty="0" err="1">
+                <a:solidFill>
+                  <a:schemeClr val="dk2"/>
+                </a:solidFill>
+              </a:rPr>
+              <a:t>Dataset</a:t>
+            </a:r>
+            <a:r>
+              <a:rPr lang="pt-BR" sz="1300" dirty="0">
+                <a:solidFill>
+                  <a:schemeClr val="dk2"/>
+                </a:solidFill>
+              </a:rPr>
+              <a:t> </a:t>
+            </a:r>
+            <a:r>
+              <a:rPr lang="pt-BR" sz="1300" dirty="0" err="1">
+                <a:solidFill>
+                  <a:schemeClr val="dk2"/>
+                </a:solidFill>
+              </a:rPr>
+              <a:t>by</a:t>
+            </a:r>
+            <a:r>
+              <a:rPr lang="pt-BR" sz="1300" dirty="0">
+                <a:solidFill>
+                  <a:schemeClr val="dk2"/>
+                </a:solidFill>
+              </a:rPr>
+              <a:t> </a:t>
+            </a:r>
+            <a:r>
+              <a:rPr lang="pt-BR" sz="1300" dirty="0" err="1">
+                <a:solidFill>
+                  <a:schemeClr val="dk2"/>
+                </a:solidFill>
+              </a:rPr>
+              <a:t>Olist</a:t>
+            </a:r>
+            <a:r>
+              <a:rPr lang="pt-BR" sz="1300" dirty="0">
+                <a:solidFill>
+                  <a:schemeClr val="dk2"/>
+                </a:solidFill>
+              </a:rPr>
               <a:t>. </a:t>
             </a:r>
             <a:r>
@@ -20398,7 +20721,7 @@
                   <a:schemeClr val="dk2"/>
                 </a:solidFill>
               </a:rPr>
-              <a:t>Brazilian</a:t>
+              <a:t>Kaggle</a:t>
             </a:r>
             <a:r>
               <a:rPr lang="pt-BR" sz="1300" dirty="0">
@@ -20406,15 +20729,16 @@
                   <a:schemeClr val="dk2"/>
                 </a:solidFill>
               </a:rPr>
-              <a:t> E-Commerce </a:t>
-            </a:r>
-            <a:r>
-              <a:rPr lang="pt-BR" sz="1300" dirty="0" err="1">
+              <a:t>, 2018. Disponível em: </a:t>
+            </a:r>
+            <a:r>
+              <a:rPr lang="pt-BR" sz="1300" dirty="0">
                 <a:solidFill>
                   <a:schemeClr val="dk2"/>
                 </a:solidFill>
-              </a:rPr>
-              <a:t>Public</a:t>
+                <a:hlinkClick r:id="rId3"/>
+              </a:rPr>
+              <a:t>https://www.kaggle.com/datasets/olistbr/brazilian-ecommerce</a:t>
             </a:r>
             <a:r>
               <a:rPr lang="pt-BR" sz="1300" dirty="0">
@@ -20422,96 +20746,7 @@
                   <a:schemeClr val="dk2"/>
                 </a:solidFill>
               </a:rPr>
-              <a:t> </a:t>
-            </a:r>
-            <a:r>
-              <a:rPr lang="pt-BR" sz="1300" dirty="0" err="1">
-                <a:solidFill>
-                  <a:schemeClr val="dk2"/>
-                </a:solidFill>
-              </a:rPr>
-              <a:t>Dataset</a:t>
-            </a:r>
-            <a:r>
-              <a:rPr lang="pt-BR" sz="1300" dirty="0">
-                <a:solidFill>
-                  <a:schemeClr val="dk2"/>
-                </a:solidFill>
-              </a:rPr>
-              <a:t> </a:t>
-            </a:r>
-            <a:r>
-              <a:rPr lang="pt-BR" sz="1300" dirty="0" err="1">
-                <a:solidFill>
-                  <a:schemeClr val="dk2"/>
-                </a:solidFill>
-              </a:rPr>
-              <a:t>by</a:t>
-            </a:r>
-            <a:r>
-              <a:rPr lang="pt-BR" sz="1300" dirty="0">
-                <a:solidFill>
-                  <a:schemeClr val="dk2"/>
-                </a:solidFill>
-              </a:rPr>
-              <a:t> </a:t>
-            </a:r>
-            <a:r>
-              <a:rPr lang="pt-BR" sz="1300" dirty="0" err="1">
-                <a:solidFill>
-                  <a:schemeClr val="dk2"/>
-                </a:solidFill>
-              </a:rPr>
-              <a:t>Olist</a:t>
-            </a:r>
-            <a:r>
-              <a:rPr lang="pt-BR" sz="1300" dirty="0">
-                <a:solidFill>
-                  <a:schemeClr val="dk2"/>
-                </a:solidFill>
-              </a:rPr>
-              <a:t>. </a:t>
-            </a:r>
-            <a:r>
-              <a:rPr lang="pt-BR" sz="1300" dirty="0" err="1">
-                <a:solidFill>
-                  <a:schemeClr val="dk2"/>
-                </a:solidFill>
-              </a:rPr>
-              <a:t>Kaggle</a:t>
-            </a:r>
-            <a:r>
-              <a:rPr lang="pt-BR" sz="1300" dirty="0">
-                <a:solidFill>
-                  <a:schemeClr val="dk2"/>
-                </a:solidFill>
-              </a:rPr>
-              <a:t>, 2018. Disponível em: </a:t>
-            </a:r>
-            <a:r>
-              <a:rPr lang="pt-BR" sz="1300" dirty="0">
-                <a:solidFill>
-                  <a:schemeClr val="dk2"/>
-                </a:solidFill>
-                <a:hlinkClick r:id="rId3"/>
-              </a:rPr>
-              <a:t>https://www.kaggle.com/datasets/olistbr/brazilian-ecommerce</a:t>
-            </a:r>
-            <a:r>
-              <a:rPr lang="pt-BR" sz="1300" dirty="0">
-                <a:solidFill>
-                  <a:schemeClr val="dk2"/>
-                </a:solidFill>
-              </a:rPr>
-              <a:t>. Acesso em: 02 dez. 2025</a:t>
-            </a:r>
-            <a:r>
-              <a:rPr lang="pt-BR" sz="1300" dirty="0">
-                <a:solidFill>
-                  <a:schemeClr val="dk2"/>
-                </a:solidFill>
-              </a:rPr>
-              <a:t>.</a:t>
+              <a:t>. Acesso em: 02 dez. 2025.</a:t>
             </a:r>
           </a:p>
           <a:p>
@@ -20528,15 +20763,7 @@
                   <a:schemeClr val="dk2"/>
                 </a:solidFill>
               </a:rPr>
-              <a:t>Metodologia </a:t>
-            </a:r>
-            <a:r>
-              <a:rPr lang="pt-BR" sz="1300" dirty="0">
-                <a:solidFill>
-                  <a:schemeClr val="dk2"/>
-                </a:solidFill>
-              </a:rPr>
-              <a:t>(Modelagem Dimensional): KIMBALL, Ralph; ROSS, </a:t>
+              <a:t>Metodologia (Modelagem Dimensional): KIMBALL, Ralph; ROSS, </a:t>
             </a:r>
             <a:r>
               <a:rPr lang="pt-BR" sz="1300" dirty="0" err="1">
@@ -20705,15 +20932,7 @@
                   <a:schemeClr val="dk2"/>
                 </a:solidFill>
               </a:rPr>
-              <a:t>de dados utilizado é público e está disponibilizado sob a licença CC BY-NC-SA 4.0. </a:t>
-            </a:r>
-            <a:r>
-              <a:rPr lang="pt-BR" altLang="pt-BR" sz="1300" dirty="0">
-                <a:solidFill>
-                  <a:schemeClr val="dk2"/>
-                </a:solidFill>
-              </a:rPr>
-              <a:t>O </a:t>
+              <a:t>de dados utilizado é público e está disponibilizado sob a licença CC BY-NC-SA 4.0. O </a:t>
             </a:r>
             <a:r>
               <a:rPr lang="pt-BR" altLang="pt-BR" sz="1300" dirty="0" err="1">
@@ -20981,7 +21200,7 @@
 </p:sld>
 </file>
 
-<file path=ppt/slides/slide36.xml><?xml version="1.0" encoding="utf-8"?>
+<file path=ppt/slides/slide37.xml><?xml version="1.0" encoding="utf-8"?>
 <p:sld xmlns:a="http://schemas.openxmlformats.org/drawingml/2006/main" xmlns:r="http://schemas.openxmlformats.org/officeDocument/2006/relationships" xmlns:p="http://schemas.openxmlformats.org/presentationml/2006/main">
   <p:cSld>
     <p:spTree>
@@ -21140,7 +21359,7 @@
 </p:sld>
 </file>
 
-<file path=ppt/slides/slide37.xml><?xml version="1.0" encoding="utf-8"?>
+<file path=ppt/slides/slide38.xml><?xml version="1.0" encoding="utf-8"?>
 <p:sld xmlns:a="http://schemas.openxmlformats.org/drawingml/2006/main" xmlns:r="http://schemas.openxmlformats.org/officeDocument/2006/relationships" xmlns:p="http://schemas.openxmlformats.org/presentationml/2006/main">
   <p:cSld>
     <p:spTree>
@@ -22569,11 +22788,7 @@
             </a:pPr>
             <a:r>
               <a:rPr lang="pt-BR" altLang="pt-BR" dirty="0"/>
-              <a:t> </a:t>
-            </a:r>
-            <a:r>
-              <a:rPr lang="pt-BR" altLang="pt-BR" dirty="0"/>
-              <a:t>Star </a:t>
+              <a:t> Star </a:t>
             </a:r>
             <a:r>
               <a:rPr lang="pt-BR" altLang="pt-BR" dirty="0" err="1"/>

</xml_diff>

<commit_message>
Adicionando análise do Sertão do Pajeú
</commit_message>
<xml_diff>
--- a/Docs/Apresentação.pptx
+++ b/Docs/Apresentação.pptx
@@ -19972,23 +19972,7 @@
                   <a:schemeClr val="dk2"/>
                 </a:solidFill>
               </a:rPr>
-              <a:t>uma forte concentração de vendas na região Sudeste, especificamente no estado de São Paulo (destacado em </a:t>
-            </a:r>
-            <a:r>
-              <a:rPr lang="pt-BR" altLang="pt-BR" dirty="0">
-                <a:solidFill>
-                  <a:schemeClr val="dk2"/>
-                </a:solidFill>
-              </a:rPr>
-              <a:t>vermelho escuro </a:t>
-            </a:r>
-            <a:r>
-              <a:rPr lang="pt-BR" altLang="pt-BR" dirty="0">
-                <a:solidFill>
-                  <a:schemeClr val="dk2"/>
-                </a:solidFill>
-              </a:rPr>
-              <a:t>no mapa), indicando uma oportunidade logística ou necessidade de expansão de marketing para outras regiões (Norte/Nordeste).</a:t>
+              <a:t>uma forte concentração de vendas na região Sudeste, especificamente no estado de São Paulo (destacado em vermelho escuro no mapa), indicando uma oportunidade logística ou necessidade de expansão de marketing para outras regiões (Norte/Nordeste).</a:t>
             </a:r>
           </a:p>
           <a:p>
@@ -20161,7 +20145,6 @@
               <a:rPr lang="pt-BR" sz="1400" dirty="0"/>
               <a:t>revela o volume exato de vendas desta microrregião, permitindo comparar sua representatividade frente ao total de todos os estados e identificar oportunidades de logística dedicada para o interior.</a:t>
             </a:r>
-            <a:endParaRPr lang="pt-BR" sz="1400" dirty="0"/>
           </a:p>
         </p:txBody>
       </p:sp>
@@ -20328,7 +20311,7 @@
       </p:sp>
       <p:pic>
         <p:nvPicPr>
-          <p:cNvPr id="2" name="Imagem 1"/>
+          <p:cNvPr id="3" name="Imagem 2"/>
           <p:cNvPicPr>
             <a:picLocks noChangeAspect="1"/>
           </p:cNvPicPr>
@@ -20342,8 +20325,8 @@
         </p:blipFill>
         <p:spPr>
           <a:xfrm>
-            <a:off x="311700" y="1559739"/>
-            <a:ext cx="6364108" cy="3583761"/>
+            <a:off x="443399" y="1629683"/>
+            <a:ext cx="5514268" cy="3418450"/>
           </a:xfrm>
           <a:prstGeom prst="rect">
             <a:avLst/>

</xml_diff>